<commit_message>
update to intro ppt
</commit_message>
<xml_diff>
--- a/Day1-BasicEAMs/1-Intro.pptx
+++ b/Day1-BasicEAMs/1-Intro.pptx
@@ -11,8 +11,8 @@
     <p:sldId id="259" r:id="rId5"/>
     <p:sldId id="271" r:id="rId6"/>
     <p:sldId id="310" r:id="rId7"/>
-    <p:sldId id="313" r:id="rId8"/>
-    <p:sldId id="308" r:id="rId9"/>
+    <p:sldId id="308" r:id="rId8"/>
+    <p:sldId id="313" r:id="rId9"/>
     <p:sldId id="262" r:id="rId10"/>
   </p:sldIdLst>
   <p:sldSz cx="12192000" cy="6858000"/>
@@ -7072,145 +7072,6 @@
           <p:cNvPr id="2" name="Title 1">
             <a:extLst>
               <a:ext uri="{FF2B5EF4-FFF2-40B4-BE49-F238E27FC236}">
-                <a16:creationId xmlns:a16="http://schemas.microsoft.com/office/drawing/2014/main" id="{B2E64197-1C11-DB3C-9778-8AC285CCDDC2}"/>
-              </a:ext>
-            </a:extLst>
-          </p:cNvPr>
-          <p:cNvSpPr>
-            <a:spLocks noGrp="1"/>
-          </p:cNvSpPr>
-          <p:nvPr>
-            <p:ph type="title"/>
-          </p:nvPr>
-        </p:nvSpPr>
-        <p:spPr/>
-        <p:txBody>
-          <a:bodyPr/>
-          <a:lstStyle/>
-          <a:p>
-            <a:r>
-              <a:rPr lang="en-GB" dirty="0"/>
-              <a:t>EMC2 Workflow</a:t>
-            </a:r>
-          </a:p>
-        </p:txBody>
-      </p:sp>
-      <p:pic>
-        <p:nvPicPr>
-          <p:cNvPr id="4" name="Picture 3">
-            <a:extLst>
-              <a:ext uri="{FF2B5EF4-FFF2-40B4-BE49-F238E27FC236}">
-                <a16:creationId xmlns:a16="http://schemas.microsoft.com/office/drawing/2014/main" id="{4D19FBB2-2291-83BE-277E-2F1A529B7B40}"/>
-              </a:ext>
-            </a:extLst>
-          </p:cNvPr>
-          <p:cNvPicPr>
-            <a:picLocks noChangeAspect="1"/>
-          </p:cNvPicPr>
-          <p:nvPr/>
-        </p:nvPicPr>
-        <p:blipFill>
-          <a:blip r:embed="rId2"/>
-          <a:stretch>
-            <a:fillRect/>
-          </a:stretch>
-        </p:blipFill>
-        <p:spPr>
-          <a:xfrm>
-            <a:off x="1623237" y="1497860"/>
-            <a:ext cx="8945526" cy="5199587"/>
-          </a:xfrm>
-          <a:prstGeom prst="rect">
-            <a:avLst/>
-          </a:prstGeom>
-        </p:spPr>
-      </p:pic>
-      <p:sp>
-        <p:nvSpPr>
-          <p:cNvPr id="6" name="TextBox 5">
-            <a:extLst>
-              <a:ext uri="{FF2B5EF4-FFF2-40B4-BE49-F238E27FC236}">
-                <a16:creationId xmlns:a16="http://schemas.microsoft.com/office/drawing/2014/main" id="{A1BD4F88-64CE-2906-A369-F33D88F02034}"/>
-              </a:ext>
-            </a:extLst>
-          </p:cNvPr>
-          <p:cNvSpPr txBox="1"/>
-          <p:nvPr/>
-        </p:nvSpPr>
-        <p:spPr>
-          <a:xfrm>
-            <a:off x="5618421" y="5849310"/>
-            <a:ext cx="4471877" cy="369332"/>
-          </a:xfrm>
-          <a:prstGeom prst="rect">
-            <a:avLst/>
-          </a:prstGeom>
-          <a:noFill/>
-        </p:spPr>
-        <p:txBody>
-          <a:bodyPr wrap="square">
-            <a:spAutoFit/>
-          </a:bodyPr>
-          <a:lstStyle/>
-          <a:p>
-            <a:r>
-              <a:rPr lang="en-GB" dirty="0"/>
-              <a:t>https://</a:t>
-            </a:r>
-            <a:r>
-              <a:rPr lang="en-GB" dirty="0" err="1"/>
-              <a:t>osf.io</a:t>
-            </a:r>
-            <a:r>
-              <a:rPr lang="en-GB" dirty="0"/>
-              <a:t>/preprints/</a:t>
-            </a:r>
-            <a:r>
-              <a:rPr lang="en-GB" dirty="0" err="1"/>
-              <a:t>psyarxiv</a:t>
-            </a:r>
-            <a:r>
-              <a:rPr lang="en-GB" dirty="0"/>
-              <a:t>/2e4dq_v4</a:t>
-            </a:r>
-          </a:p>
-        </p:txBody>
-      </p:sp>
-    </p:spTree>
-    <p:extLst>
-      <p:ext uri="{BB962C8B-B14F-4D97-AF65-F5344CB8AC3E}">
-        <p14:creationId xmlns:p14="http://schemas.microsoft.com/office/powerpoint/2010/main" val="3097212077"/>
-      </p:ext>
-    </p:extLst>
-  </p:cSld>
-  <p:clrMapOvr>
-    <a:masterClrMapping/>
-  </p:clrMapOvr>
-</p:sld>
-</file>
-
-<file path=ppt/slides/slide8.xml><?xml version="1.0" encoding="utf-8"?>
-<p:sld xmlns:a="http://schemas.openxmlformats.org/drawingml/2006/main" xmlns:r="http://schemas.openxmlformats.org/officeDocument/2006/relationships" xmlns:p="http://schemas.openxmlformats.org/presentationml/2006/main">
-  <p:cSld>
-    <p:spTree>
-      <p:nvGrpSpPr>
-        <p:cNvPr id="1" name=""/>
-        <p:cNvGrpSpPr/>
-        <p:nvPr/>
-      </p:nvGrpSpPr>
-      <p:grpSpPr>
-        <a:xfrm>
-          <a:off x="0" y="0"/>
-          <a:ext cx="0" cy="0"/>
-          <a:chOff x="0" y="0"/>
-          <a:chExt cx="0" cy="0"/>
-        </a:xfrm>
-      </p:grpSpPr>
-      <p:sp>
-        <p:nvSpPr>
-          <p:cNvPr id="2" name="Title 1">
-            <a:extLst>
-              <a:ext uri="{FF2B5EF4-FFF2-40B4-BE49-F238E27FC236}">
                 <a16:creationId xmlns:a16="http://schemas.microsoft.com/office/drawing/2014/main" id="{FC0E869C-19EA-B5C2-0106-3760F294A861}"/>
               </a:ext>
             </a:extLst>
@@ -7872,6 +7733,145 @@
 </p:sld>
 </file>
 
+<file path=ppt/slides/slide8.xml><?xml version="1.0" encoding="utf-8"?>
+<p:sld xmlns:a="http://schemas.openxmlformats.org/drawingml/2006/main" xmlns:r="http://schemas.openxmlformats.org/officeDocument/2006/relationships" xmlns:p="http://schemas.openxmlformats.org/presentationml/2006/main">
+  <p:cSld>
+    <p:spTree>
+      <p:nvGrpSpPr>
+        <p:cNvPr id="1" name=""/>
+        <p:cNvGrpSpPr/>
+        <p:nvPr/>
+      </p:nvGrpSpPr>
+      <p:grpSpPr>
+        <a:xfrm>
+          <a:off x="0" y="0"/>
+          <a:ext cx="0" cy="0"/>
+          <a:chOff x="0" y="0"/>
+          <a:chExt cx="0" cy="0"/>
+        </a:xfrm>
+      </p:grpSpPr>
+      <p:sp>
+        <p:nvSpPr>
+          <p:cNvPr id="2" name="Title 1">
+            <a:extLst>
+              <a:ext uri="{FF2B5EF4-FFF2-40B4-BE49-F238E27FC236}">
+                <a16:creationId xmlns:a16="http://schemas.microsoft.com/office/drawing/2014/main" id="{B2E64197-1C11-DB3C-9778-8AC285CCDDC2}"/>
+              </a:ext>
+            </a:extLst>
+          </p:cNvPr>
+          <p:cNvSpPr>
+            <a:spLocks noGrp="1"/>
+          </p:cNvSpPr>
+          <p:nvPr>
+            <p:ph type="title"/>
+          </p:nvPr>
+        </p:nvSpPr>
+        <p:spPr/>
+        <p:txBody>
+          <a:bodyPr/>
+          <a:lstStyle/>
+          <a:p>
+            <a:r>
+              <a:rPr lang="en-GB" dirty="0"/>
+              <a:t>EMC2 Workflow</a:t>
+            </a:r>
+          </a:p>
+        </p:txBody>
+      </p:sp>
+      <p:pic>
+        <p:nvPicPr>
+          <p:cNvPr id="4" name="Picture 3">
+            <a:extLst>
+              <a:ext uri="{FF2B5EF4-FFF2-40B4-BE49-F238E27FC236}">
+                <a16:creationId xmlns:a16="http://schemas.microsoft.com/office/drawing/2014/main" id="{4D19FBB2-2291-83BE-277E-2F1A529B7B40}"/>
+              </a:ext>
+            </a:extLst>
+          </p:cNvPr>
+          <p:cNvPicPr>
+            <a:picLocks noChangeAspect="1"/>
+          </p:cNvPicPr>
+          <p:nvPr/>
+        </p:nvPicPr>
+        <p:blipFill>
+          <a:blip r:embed="rId2"/>
+          <a:stretch>
+            <a:fillRect/>
+          </a:stretch>
+        </p:blipFill>
+        <p:spPr>
+          <a:xfrm>
+            <a:off x="1623237" y="1497860"/>
+            <a:ext cx="8945526" cy="5199587"/>
+          </a:xfrm>
+          <a:prstGeom prst="rect">
+            <a:avLst/>
+          </a:prstGeom>
+        </p:spPr>
+      </p:pic>
+      <p:sp>
+        <p:nvSpPr>
+          <p:cNvPr id="6" name="TextBox 5">
+            <a:extLst>
+              <a:ext uri="{FF2B5EF4-FFF2-40B4-BE49-F238E27FC236}">
+                <a16:creationId xmlns:a16="http://schemas.microsoft.com/office/drawing/2014/main" id="{A1BD4F88-64CE-2906-A369-F33D88F02034}"/>
+              </a:ext>
+            </a:extLst>
+          </p:cNvPr>
+          <p:cNvSpPr txBox="1"/>
+          <p:nvPr/>
+        </p:nvSpPr>
+        <p:spPr>
+          <a:xfrm>
+            <a:off x="5618421" y="5849310"/>
+            <a:ext cx="4471877" cy="369332"/>
+          </a:xfrm>
+          <a:prstGeom prst="rect">
+            <a:avLst/>
+          </a:prstGeom>
+          <a:noFill/>
+        </p:spPr>
+        <p:txBody>
+          <a:bodyPr wrap="square">
+            <a:spAutoFit/>
+          </a:bodyPr>
+          <a:lstStyle/>
+          <a:p>
+            <a:r>
+              <a:rPr lang="en-GB" dirty="0"/>
+              <a:t>https://</a:t>
+            </a:r>
+            <a:r>
+              <a:rPr lang="en-GB" dirty="0" err="1"/>
+              <a:t>osf.io</a:t>
+            </a:r>
+            <a:r>
+              <a:rPr lang="en-GB" dirty="0"/>
+              <a:t>/preprints/</a:t>
+            </a:r>
+            <a:r>
+              <a:rPr lang="en-GB" dirty="0" err="1"/>
+              <a:t>psyarxiv</a:t>
+            </a:r>
+            <a:r>
+              <a:rPr lang="en-GB" dirty="0"/>
+              <a:t>/2e4dq_v4</a:t>
+            </a:r>
+          </a:p>
+        </p:txBody>
+      </p:sp>
+    </p:spTree>
+    <p:extLst>
+      <p:ext uri="{BB962C8B-B14F-4D97-AF65-F5344CB8AC3E}">
+        <p14:creationId xmlns:p14="http://schemas.microsoft.com/office/powerpoint/2010/main" val="3097212077"/>
+      </p:ext>
+    </p:extLst>
+  </p:cSld>
+  <p:clrMapOvr>
+    <a:masterClrMapping/>
+  </p:clrMapOvr>
+</p:sld>
+</file>
+
 <file path=ppt/slides/slide9.xml><?xml version="1.0" encoding="utf-8"?>
 <p:sld xmlns:a="http://schemas.openxmlformats.org/drawingml/2006/main" xmlns:r="http://schemas.openxmlformats.org/officeDocument/2006/relationships" xmlns:p="http://schemas.openxmlformats.org/presentationml/2006/main">
   <p:cSld>
@@ -8128,20 +8128,12 @@
               <a:buChar char="•"/>
             </a:pPr>
             <a:r>
-              <a:rPr lang="en-US" sz="2000">
-                <a:solidFill>
-                  <a:prstClr val="black"/>
-                </a:solidFill>
-              </a:rPr>
-              <a:t>First, </a:t>
-            </a:r>
-            <a:r>
               <a:rPr lang="en-US" sz="2000" dirty="0">
                 <a:solidFill>
                   <a:prstClr val="black"/>
                 </a:solidFill>
               </a:rPr>
-              <a:t>we will do some exercises in the 1-BasicEAMs.R script.</a:t>
+              <a:t>First, we will do some exercises in the 1-BasicEAMs.R script.</a:t>
             </a:r>
           </a:p>
           <a:p>

</xml_diff>